<commit_message>
finished part 1 of cloud
</commit_message>
<xml_diff>
--- a/Cloud_Computing/Labs/Assignment/part 1/Solution Template.pptx
+++ b/Cloud_Computing/Labs/Assignment/part 1/Solution Template.pptx
@@ -215,7 +215,7 @@
           <a:p>
             <a:fld id="{901573B9-73F1-8C4E-BD0C-C838745D5DAA}" type="datetimeFigureOut">
               <a:rPr lang="en-GB" smtClean="0"/>
-              <a:t>14/11/2018</a:t>
+              <a:t>15/11/2018</a:t>
             </a:fld>
             <a:endParaRPr lang="en-GB"/>
           </a:p>
@@ -2136,7 +2136,7 @@
           <a:p>
             <a:fld id="{B36DA745-2800-624C-8416-BA05E103A172}" type="datetimeFigureOut">
               <a:rPr lang="en-GB" smtClean="0"/>
-              <a:t>14/11/2018</a:t>
+              <a:t>15/11/2018</a:t>
             </a:fld>
             <a:endParaRPr lang="en-GB"/>
           </a:p>
@@ -2336,7 +2336,7 @@
           <a:p>
             <a:fld id="{B36DA745-2800-624C-8416-BA05E103A172}" type="datetimeFigureOut">
               <a:rPr lang="en-GB" smtClean="0"/>
-              <a:t>14/11/2018</a:t>
+              <a:t>15/11/2018</a:t>
             </a:fld>
             <a:endParaRPr lang="en-GB"/>
           </a:p>
@@ -2546,7 +2546,7 @@
           <a:p>
             <a:fld id="{B36DA745-2800-624C-8416-BA05E103A172}" type="datetimeFigureOut">
               <a:rPr lang="en-GB" smtClean="0"/>
-              <a:t>14/11/2018</a:t>
+              <a:t>15/11/2018</a:t>
             </a:fld>
             <a:endParaRPr lang="en-GB"/>
           </a:p>
@@ -3502,7 +3502,7 @@
           <a:p>
             <a:fld id="{B36DA745-2800-624C-8416-BA05E103A172}" type="datetimeFigureOut">
               <a:rPr lang="en-GB" smtClean="0"/>
-              <a:t>14/11/2018</a:t>
+              <a:t>15/11/2018</a:t>
             </a:fld>
             <a:endParaRPr lang="en-GB"/>
           </a:p>
@@ -3778,7 +3778,7 @@
           <a:p>
             <a:fld id="{B36DA745-2800-624C-8416-BA05E103A172}" type="datetimeFigureOut">
               <a:rPr lang="en-GB" smtClean="0"/>
-              <a:t>14/11/2018</a:t>
+              <a:t>15/11/2018</a:t>
             </a:fld>
             <a:endParaRPr lang="en-GB"/>
           </a:p>
@@ -4046,7 +4046,7 @@
           <a:p>
             <a:fld id="{B36DA745-2800-624C-8416-BA05E103A172}" type="datetimeFigureOut">
               <a:rPr lang="en-GB" smtClean="0"/>
-              <a:t>14/11/2018</a:t>
+              <a:t>15/11/2018</a:t>
             </a:fld>
             <a:endParaRPr lang="en-GB"/>
           </a:p>
@@ -4461,7 +4461,7 @@
           <a:p>
             <a:fld id="{B36DA745-2800-624C-8416-BA05E103A172}" type="datetimeFigureOut">
               <a:rPr lang="en-GB" smtClean="0"/>
-              <a:t>14/11/2018</a:t>
+              <a:t>15/11/2018</a:t>
             </a:fld>
             <a:endParaRPr lang="en-GB"/>
           </a:p>
@@ -4603,7 +4603,7 @@
           <a:p>
             <a:fld id="{B36DA745-2800-624C-8416-BA05E103A172}" type="datetimeFigureOut">
               <a:rPr lang="en-GB" smtClean="0"/>
-              <a:t>14/11/2018</a:t>
+              <a:t>15/11/2018</a:t>
             </a:fld>
             <a:endParaRPr lang="en-GB"/>
           </a:p>
@@ -4716,7 +4716,7 @@
           <a:p>
             <a:fld id="{B36DA745-2800-624C-8416-BA05E103A172}" type="datetimeFigureOut">
               <a:rPr lang="en-GB" smtClean="0"/>
-              <a:t>14/11/2018</a:t>
+              <a:t>15/11/2018</a:t>
             </a:fld>
             <a:endParaRPr lang="en-GB"/>
           </a:p>
@@ -5029,7 +5029,7 @@
           <a:p>
             <a:fld id="{B36DA745-2800-624C-8416-BA05E103A172}" type="datetimeFigureOut">
               <a:rPr lang="en-GB" smtClean="0"/>
-              <a:t>14/11/2018</a:t>
+              <a:t>15/11/2018</a:t>
             </a:fld>
             <a:endParaRPr lang="en-GB"/>
           </a:p>
@@ -5318,7 +5318,7 @@
           <a:p>
             <a:fld id="{B36DA745-2800-624C-8416-BA05E103A172}" type="datetimeFigureOut">
               <a:rPr lang="en-GB" smtClean="0"/>
-              <a:t>14/11/2018</a:t>
+              <a:t>15/11/2018</a:t>
             </a:fld>
             <a:endParaRPr lang="en-GB"/>
           </a:p>
@@ -5561,7 +5561,7 @@
           <a:p>
             <a:fld id="{B36DA745-2800-624C-8416-BA05E103A172}" type="datetimeFigureOut">
               <a:rPr lang="en-GB" smtClean="0"/>
-              <a:t>14/11/2018</a:t>
+              <a:t>15/11/2018</a:t>
             </a:fld>
             <a:endParaRPr lang="en-GB"/>
           </a:p>
@@ -17693,7 +17693,7 @@
           <p:nvPr>
             <p:extLst>
               <p:ext uri="{D42A27DB-BD31-4B8C-83A1-F6EECF244321}">
-                <p14:modId xmlns:p14="http://schemas.microsoft.com/office/powerpoint/2010/main" val="2813682543"/>
+                <p14:modId xmlns:p14="http://schemas.microsoft.com/office/powerpoint/2010/main" val="2424108168"/>
               </p:ext>
             </p:extLst>
           </p:nvPr>
@@ -19059,7 +19059,7 @@
                           <a:ea typeface="+mn-ea"/>
                           <a:cs typeface="+mn-cs"/>
                         </a:rPr>
-                        <a:t>EC2</a:t>
+                        <a:t>RDS</a:t>
                       </a:r>
                     </a:p>
                   </a:txBody>
@@ -29861,29 +29861,35 @@
           </a:p>
         </p:txBody>
       </p:sp>
-      <p:sp>
-        <p:nvSpPr>
-          <p:cNvPr id="3" name="Content Placeholder 2"/>
-          <p:cNvSpPr>
-            <a:spLocks noGrp="1"/>
-          </p:cNvSpPr>
+      <p:pic>
+        <p:nvPicPr>
+          <p:cNvPr id="10" name="Content Placeholder 9" descr="A close up of a map&#10;&#10;Description generated with high confidence">
+            <a:extLst>
+              <a:ext uri="{FF2B5EF4-FFF2-40B4-BE49-F238E27FC236}">
+                <a16:creationId xmlns:a16="http://schemas.microsoft.com/office/drawing/2014/main" id="{ABFEC6B5-ED93-48F7-AA7E-5496867AFF2F}"/>
+              </a:ext>
+            </a:extLst>
+          </p:cNvPr>
+          <p:cNvPicPr>
+            <a:picLocks noGrp="1" noChangeAspect="1"/>
+          </p:cNvPicPr>
           <p:nvPr>
             <p:ph idx="1"/>
           </p:nvPr>
-        </p:nvSpPr>
-        <p:spPr/>
-        <p:txBody>
-          <a:bodyPr/>
-          <a:lstStyle/>
-          <a:p>
-            <a:pPr marL="457189" indent="-457189">
-              <a:buFont typeface="Arial" charset="0"/>
-              <a:buChar char="•"/>
-            </a:pPr>
-            <a:endParaRPr lang="en-US" dirty="0"/>
-          </a:p>
-        </p:txBody>
-      </p:sp>
+        </p:nvPicPr>
+        <p:blipFill>
+          <a:blip r:embed="rId3"/>
+          <a:stretch>
+            <a:fillRect/>
+          </a:stretch>
+        </p:blipFill>
+        <p:spPr>
+          <a:xfrm>
+            <a:off x="1263600" y="1825625"/>
+            <a:ext cx="9664800" cy="4351338"/>
+          </a:xfrm>
+        </p:spPr>
+      </p:pic>
       <p:sp>
         <p:nvSpPr>
           <p:cNvPr id="4" name="Footer Placeholder 3"/>

</xml_diff>